<commit_message>
presentation and bug fix
</commit_message>
<xml_diff>
--- a/Презентация.pptx
+++ b/Презентация.pptx
@@ -7,13 +7,16 @@
   <p:sldIdLst>
     <p:sldId id="256" r:id="rId2"/>
     <p:sldId id="257" r:id="rId3"/>
-    <p:sldId id="258" r:id="rId4"/>
-    <p:sldId id="259" r:id="rId5"/>
-    <p:sldId id="260" r:id="rId6"/>
+    <p:sldId id="260" r:id="rId4"/>
+    <p:sldId id="258" r:id="rId5"/>
+    <p:sldId id="262" r:id="rId6"/>
     <p:sldId id="264" r:id="rId7"/>
-    <p:sldId id="262" r:id="rId8"/>
-    <p:sldId id="263" r:id="rId9"/>
-    <p:sldId id="261" r:id="rId10"/>
+    <p:sldId id="263" r:id="rId8"/>
+    <p:sldId id="265" r:id="rId9"/>
+    <p:sldId id="266" r:id="rId10"/>
+    <p:sldId id="267" r:id="rId11"/>
+    <p:sldId id="268" r:id="rId12"/>
+    <p:sldId id="261" r:id="rId13"/>
   </p:sldIdLst>
   <p:sldSz cx="12192000" cy="6858000"/>
   <p:notesSz cx="6858000" cy="9144000"/>
@@ -123,6 +126,7 @@
 <file path=ppt/revisionInfo.xml><?xml version="1.0" encoding="utf-8"?>
 <p1510:revInfo xmlns:a="http://schemas.openxmlformats.org/drawingml/2006/main" xmlns:r="http://schemas.openxmlformats.org/officeDocument/2006/relationships" xmlns:p1510="http://schemas.microsoft.com/office/powerpoint/2015/10/main">
   <p1510:revLst>
+    <p1510:client id="{21A2D5DE-A42F-42CB-82A5-4DFA8A9ED9CE}" v="861" dt="2023-12-29T20:04:56.434"/>
     <p1510:client id="{45D8E093-C9F7-4DB1-ABB6-27CA8F742C26}" v="299" dt="2023-12-23T21:17:26.597"/>
     <p1510:client id="{917BA6D4-8D7E-4C3F-BB89-3E9DBE984423}" v="1056" dt="2023-12-24T16:16:36.205"/>
     <p1510:client id="{E150F889-126E-4319-9C77-243B9F2B3723}" v="497" dt="2023-12-26T20:15:40.264"/>
@@ -339,7 +343,7 @@
           <a:p>
             <a:fld id="{92538219-6E45-4D12-B767-46F92D5844D4}" type="datetime1">
               <a:rPr lang="en-US" smtClean="0"/>
-              <a:t>12/26/2023</a:t>
+              <a:t>12/29/2023</a:t>
             </a:fld>
             <a:endParaRPr lang="en-US"/>
           </a:p>
@@ -537,7 +541,7 @@
           <a:p>
             <a:fld id="{836430B8-6059-41E5-A5DC-C07A76F5859A}" type="datetime1">
               <a:rPr lang="en-US" smtClean="0"/>
-              <a:t>12/26/2023</a:t>
+              <a:t>12/29/2023</a:t>
             </a:fld>
             <a:endParaRPr lang="en-US"/>
           </a:p>
@@ -799,7 +803,7 @@
           <a:p>
             <a:fld id="{A09D0CB7-D16E-4358-B7F4-EA4A24554592}" type="datetime1">
               <a:rPr lang="en-US" smtClean="0"/>
-              <a:t>12/26/2023</a:t>
+              <a:t>12/29/2023</a:t>
             </a:fld>
             <a:endParaRPr lang="en-US"/>
           </a:p>
@@ -1015,7 +1019,7 @@
           <a:p>
             <a:fld id="{8BB296A2-D8F0-4E17-BFD0-A6C902250D59}" type="datetime1">
               <a:rPr lang="en-US" smtClean="0"/>
-              <a:t>12/26/2023</a:t>
+              <a:t>12/29/2023</a:t>
             </a:fld>
             <a:endParaRPr lang="en-US"/>
           </a:p>
@@ -1345,7 +1349,7 @@
           <a:p>
             <a:fld id="{D9108C9C-1ACB-4C84-A002-C7E0E45B937A}" type="datetime1">
               <a:rPr lang="en-US" smtClean="0"/>
-              <a:t>12/26/2023</a:t>
+              <a:t>12/29/2023</a:t>
             </a:fld>
             <a:endParaRPr lang="en-US"/>
           </a:p>
@@ -1618,7 +1622,7 @@
           <a:p>
             <a:fld id="{F49AF2A5-B297-4977-9E5B-4D3050E23689}" type="datetime1">
               <a:rPr lang="en-US" smtClean="0"/>
-              <a:t>12/26/2023</a:t>
+              <a:t>12/29/2023</a:t>
             </a:fld>
             <a:endParaRPr lang="en-US"/>
           </a:p>
@@ -2033,7 +2037,7 @@
           <a:p>
             <a:fld id="{70127434-4794-409A-9547-04789BA47588}" type="datetime1">
               <a:rPr lang="en-US" smtClean="0"/>
-              <a:t>12/26/2023</a:t>
+              <a:t>12/29/2023</a:t>
             </a:fld>
             <a:endParaRPr lang="en-US"/>
           </a:p>
@@ -2174,7 +2178,7 @@
           <a:p>
             <a:fld id="{85658635-357A-4E3D-B824-A5CEFDB8449C}" type="datetime1">
               <a:rPr lang="en-US" smtClean="0"/>
-              <a:t>12/26/2023</a:t>
+              <a:t>12/29/2023</a:t>
             </a:fld>
             <a:endParaRPr lang="en-US"/>
           </a:p>
@@ -2287,7 +2291,7 @@
           <a:p>
             <a:fld id="{7E86FF77-2719-4AD0-8740-0B90FF5D1EFB}" type="datetime1">
               <a:rPr lang="en-US" smtClean="0"/>
-              <a:t>12/26/2023</a:t>
+              <a:t>12/29/2023</a:t>
             </a:fld>
             <a:endParaRPr lang="en-US"/>
           </a:p>
@@ -2783,7 +2787,7 @@
           <a:p>
             <a:fld id="{6E441C83-1089-48B9-8B65-293D4C236D35}" type="datetime1">
               <a:rPr lang="en-US" smtClean="0"/>
-              <a:t>12/26/2023</a:t>
+              <a:t>12/29/2023</a:t>
             </a:fld>
             <a:endParaRPr lang="en-US"/>
           </a:p>
@@ -3259,7 +3263,7 @@
           <a:p>
             <a:fld id="{D162FE45-CC1E-47DB-8B82-6CF0636FBDB8}" type="datetime1">
               <a:rPr lang="en-US" smtClean="0"/>
-              <a:t>12/26/2023</a:t>
+              <a:t>12/29/2023</a:t>
             </a:fld>
             <a:endParaRPr lang="en-US"/>
           </a:p>
@@ -3554,7 +3558,7 @@
           <a:p>
             <a:fld id="{51FC8E16-3C03-4238-9C6F-B34F3D10F77E}" type="datetime1">
               <a:rPr lang="en-US" smtClean="0"/>
-              <a:t>12/26/2023</a:t>
+              <a:t>12/29/2023</a:t>
             </a:fld>
             <a:endParaRPr lang="en-US" dirty="0"/>
           </a:p>
@@ -4195,11 +4199,6 @@
               <a:rPr lang="ru-RU" dirty="0" err="1"/>
               <a:t>Дэян</a:t>
             </a:r>
-            <a:r>
-              <a:rPr lang="ru-RU" dirty="0"/>
-              <a:t> 10 Б</a:t>
-            </a:r>
-            <a:endParaRPr lang="ru-RU"/>
           </a:p>
           <a:p>
             <a:pPr>
@@ -4250,6 +4249,554 @@
     <p:extLst>
       <p:ext uri="{BB962C8B-B14F-4D97-AF65-F5344CB8AC3E}">
         <p14:creationId xmlns:p14="http://schemas.microsoft.com/office/powerpoint/2010/main" val="1351651579"/>
+      </p:ext>
+    </p:extLst>
+  </p:cSld>
+  <p:clrMapOvr>
+    <a:masterClrMapping/>
+  </p:clrMapOvr>
+</p:sld>
+</file>
+
+<file path=ppt/slides/slide10.xml><?xml version="1.0" encoding="utf-8"?>
+<p:sld xmlns:a="http://schemas.openxmlformats.org/drawingml/2006/main" xmlns:r="http://schemas.openxmlformats.org/officeDocument/2006/relationships" xmlns:p="http://schemas.openxmlformats.org/presentationml/2006/main">
+  <p:cSld>
+    <p:bg>
+      <p:bgPr>
+        <a:solidFill>
+          <a:schemeClr val="bg1"/>
+        </a:solidFill>
+        <a:effectLst/>
+      </p:bgPr>
+    </p:bg>
+    <p:spTree>
+      <p:nvGrpSpPr>
+        <p:cNvPr id="1" name=""/>
+        <p:cNvGrpSpPr/>
+        <p:nvPr/>
+      </p:nvGrpSpPr>
+      <p:grpSpPr>
+        <a:xfrm>
+          <a:off x="0" y="0"/>
+          <a:ext cx="0" cy="0"/>
+          <a:chOff x="0" y="0"/>
+          <a:chExt cx="0" cy="0"/>
+        </a:xfrm>
+      </p:grpSpPr>
+      <p:sp useBgFill="1">
+        <p:nvSpPr>
+          <p:cNvPr id="9" name="Rectangle 8">
+            <a:extLst>
+              <a:ext uri="{FF2B5EF4-FFF2-40B4-BE49-F238E27FC236}">
+                <a16:creationId xmlns:a16="http://schemas.microsoft.com/office/drawing/2014/main" id="{F06B261F-632C-43DC-8DC7-7723B368270D}"/>
+              </a:ext>
+              <a:ext uri="{C183D7F6-B498-43B3-948B-1728B52AA6E4}">
+                <adec:decorative xmlns:adec="http://schemas.microsoft.com/office/drawing/2017/decorative" val="1"/>
+              </a:ext>
+            </a:extLst>
+          </p:cNvPr>
+          <p:cNvSpPr>
+            <a:spLocks noGrp="1" noRot="1" noChangeAspect="1" noMove="1" noResize="1" noEditPoints="1" noAdjustHandles="1" noChangeArrowheads="1" noChangeShapeType="1" noTextEdit="1"/>
+          </p:cNvSpPr>
+          <p:nvPr>
+            <p:extLst>
+              <p:ext uri="{386F3935-93C4-4BCD-93E2-E3B085C9AB24}">
+                <p16:designElem xmlns:p16="http://schemas.microsoft.com/office/powerpoint/2015/main" val="1"/>
+              </p:ext>
+            </p:extLst>
+          </p:nvPr>
+        </p:nvSpPr>
+        <p:spPr>
+          <a:xfrm>
+            <a:off x="0" y="0"/>
+            <a:ext cx="12192000" cy="6858000"/>
+          </a:xfrm>
+          <a:prstGeom prst="rect">
+            <a:avLst/>
+          </a:prstGeom>
+          <a:ln>
+            <a:noFill/>
+          </a:ln>
+        </p:spPr>
+        <p:style>
+          <a:lnRef idx="2">
+            <a:schemeClr val="accent1">
+              <a:shade val="50000"/>
+            </a:schemeClr>
+          </a:lnRef>
+          <a:fillRef idx="1">
+            <a:schemeClr val="accent1"/>
+          </a:fillRef>
+          <a:effectRef idx="0">
+            <a:schemeClr val="accent1"/>
+          </a:effectRef>
+          <a:fontRef idx="minor">
+            <a:schemeClr val="lt1"/>
+          </a:fontRef>
+        </p:style>
+        <p:txBody>
+          <a:bodyPr rtlCol="0" anchor="ctr"/>
+          <a:lstStyle/>
+          <a:p>
+            <a:pPr algn="ctr"/>
+            <a:endParaRPr lang="en-US"/>
+          </a:p>
+        </p:txBody>
+      </p:sp>
+      <p:sp>
+        <p:nvSpPr>
+          <p:cNvPr id="11" name="Rectangle 10">
+            <a:extLst>
+              <a:ext uri="{FF2B5EF4-FFF2-40B4-BE49-F238E27FC236}">
+                <a16:creationId xmlns:a16="http://schemas.microsoft.com/office/drawing/2014/main" id="{4E524C7F-EE50-42C5-9434-7C78CE04445B}"/>
+              </a:ext>
+              <a:ext uri="{C183D7F6-B498-43B3-948B-1728B52AA6E4}">
+                <adec:decorative xmlns:adec="http://schemas.microsoft.com/office/drawing/2017/decorative" val="1"/>
+              </a:ext>
+            </a:extLst>
+          </p:cNvPr>
+          <p:cNvSpPr>
+            <a:spLocks noGrp="1" noRot="1" noChangeAspect="1" noMove="1" noResize="1" noEditPoints="1" noAdjustHandles="1" noChangeArrowheads="1" noChangeShapeType="1" noTextEdit="1"/>
+          </p:cNvSpPr>
+          <p:nvPr>
+            <p:extLst>
+              <p:ext uri="{386F3935-93C4-4BCD-93E2-E3B085C9AB24}">
+                <p16:designElem xmlns:p16="http://schemas.microsoft.com/office/powerpoint/2015/main" val="1"/>
+              </p:ext>
+            </p:extLst>
+          </p:nvPr>
+        </p:nvSpPr>
+        <p:spPr>
+          <a:xfrm>
+            <a:off x="0" y="0"/>
+            <a:ext cx="6095998" cy="6861333"/>
+          </a:xfrm>
+          <a:prstGeom prst="rect">
+            <a:avLst/>
+          </a:prstGeom>
+          <a:solidFill>
+            <a:schemeClr val="tx2"/>
+          </a:solidFill>
+          <a:ln>
+            <a:noFill/>
+          </a:ln>
+        </p:spPr>
+        <p:style>
+          <a:lnRef idx="2">
+            <a:schemeClr val="accent1">
+              <a:shade val="50000"/>
+            </a:schemeClr>
+          </a:lnRef>
+          <a:fillRef idx="1">
+            <a:schemeClr val="accent1"/>
+          </a:fillRef>
+          <a:effectRef idx="0">
+            <a:schemeClr val="accent1"/>
+          </a:effectRef>
+          <a:fontRef idx="minor">
+            <a:schemeClr val="lt1"/>
+          </a:fontRef>
+        </p:style>
+        <p:txBody>
+          <a:bodyPr rtlCol="0" anchor="ctr"/>
+          <a:lstStyle/>
+          <a:p>
+            <a:pPr algn="ctr"/>
+            <a:endParaRPr lang="en-US"/>
+          </a:p>
+        </p:txBody>
+      </p:sp>
+      <p:sp>
+        <p:nvSpPr>
+          <p:cNvPr id="2" name="Заголовок 1">
+            <a:extLst>
+              <a:ext uri="{FF2B5EF4-FFF2-40B4-BE49-F238E27FC236}">
+                <a16:creationId xmlns:a16="http://schemas.microsoft.com/office/drawing/2014/main" id="{DA4A3E56-4F0B-D3EA-766B-828859F2ECA2}"/>
+              </a:ext>
+            </a:extLst>
+          </p:cNvPr>
+          <p:cNvSpPr>
+            <a:spLocks noGrp="1"/>
+          </p:cNvSpPr>
+          <p:nvPr>
+            <p:ph type="title"/>
+          </p:nvPr>
+        </p:nvSpPr>
+        <p:spPr>
+          <a:xfrm>
+            <a:off x="484552" y="365125"/>
+            <a:ext cx="5022630" cy="2430030"/>
+          </a:xfrm>
+        </p:spPr>
+        <p:txBody>
+          <a:bodyPr>
+            <a:normAutofit/>
+          </a:bodyPr>
+          <a:lstStyle/>
+          <a:p>
+            <a:r>
+              <a:rPr lang="ru-RU" dirty="0"/>
+              <a:t>Основные классы</a:t>
+            </a:r>
+          </a:p>
+        </p:txBody>
+      </p:sp>
+      <p:sp>
+        <p:nvSpPr>
+          <p:cNvPr id="3" name="Объект 2">
+            <a:extLst>
+              <a:ext uri="{FF2B5EF4-FFF2-40B4-BE49-F238E27FC236}">
+                <a16:creationId xmlns:a16="http://schemas.microsoft.com/office/drawing/2014/main" id="{A4BC2EB2-3AE3-0A40-0D0D-3CB0BD1B904E}"/>
+              </a:ext>
+            </a:extLst>
+          </p:cNvPr>
+          <p:cNvSpPr>
+            <a:spLocks noGrp="1"/>
+          </p:cNvSpPr>
+          <p:nvPr>
+            <p:ph idx="1"/>
+          </p:nvPr>
+        </p:nvSpPr>
+        <p:spPr>
+          <a:xfrm>
+            <a:off x="484552" y="3054927"/>
+            <a:ext cx="5022630" cy="3122036"/>
+          </a:xfrm>
+        </p:spPr>
+        <p:txBody>
+          <a:bodyPr vert="horz" lIns="91440" tIns="45720" rIns="91440" bIns="45720" rtlCol="0" anchor="t">
+            <a:normAutofit/>
+          </a:bodyPr>
+          <a:lstStyle/>
+          <a:p>
+            <a:r>
+              <a:rPr lang="ru-RU" dirty="0">
+                <a:solidFill>
+                  <a:schemeClr val="bg1"/>
+                </a:solidFill>
+              </a:rPr>
+              <a:t>Окно класса </a:t>
+            </a:r>
+            <a:r>
+              <a:rPr lang="ru-RU" dirty="0" err="1">
+                <a:solidFill>
+                  <a:schemeClr val="bg1"/>
+                </a:solidFill>
+              </a:rPr>
+              <a:t>AddMoneyPage</a:t>
+            </a:r>
+            <a:r>
+              <a:rPr lang="ru-RU" dirty="0">
+                <a:solidFill>
+                  <a:schemeClr val="bg1"/>
+                </a:solidFill>
+              </a:rPr>
+              <a:t> служит для пополнения списания средств со счетов</a:t>
+            </a:r>
+          </a:p>
+          <a:p>
+            <a:r>
+              <a:rPr lang="ru-RU" dirty="0">
+                <a:solidFill>
+                  <a:schemeClr val="bg1"/>
+                </a:solidFill>
+              </a:rPr>
+              <a:t>Можно выбрать сумму пополнения с помощью Double </a:t>
+            </a:r>
+            <a:r>
+              <a:rPr lang="ru-RU" dirty="0" err="1">
+                <a:solidFill>
+                  <a:schemeClr val="bg1"/>
+                </a:solidFill>
+                <a:ea typeface="+mn-lt"/>
+                <a:cs typeface="+mn-lt"/>
+              </a:rPr>
+              <a:t>QDoubleSpinBox</a:t>
+            </a:r>
+            <a:r>
+              <a:rPr lang="ru-RU" dirty="0">
+                <a:solidFill>
+                  <a:schemeClr val="bg1"/>
+                </a:solidFill>
+                <a:ea typeface="+mn-lt"/>
+                <a:cs typeface="+mn-lt"/>
+              </a:rPr>
+              <a:t>, а также по желанию указать источник дохода</a:t>
+            </a:r>
+          </a:p>
+        </p:txBody>
+      </p:sp>
+      <p:pic>
+        <p:nvPicPr>
+          <p:cNvPr id="4" name="Рисунок 3" descr="Изображение выглядит как текст, снимок экрана, Шрифт&#10;&#10;Автоматически созданное описание">
+            <a:extLst>
+              <a:ext uri="{FF2B5EF4-FFF2-40B4-BE49-F238E27FC236}">
+                <a16:creationId xmlns:a16="http://schemas.microsoft.com/office/drawing/2014/main" id="{5E9E40C6-A5C6-23E8-855F-36DB2CA97156}"/>
+              </a:ext>
+            </a:extLst>
+          </p:cNvPr>
+          <p:cNvPicPr>
+            <a:picLocks noChangeAspect="1"/>
+          </p:cNvPicPr>
+          <p:nvPr/>
+        </p:nvPicPr>
+        <p:blipFill>
+          <a:blip r:embed="rId2"/>
+          <a:stretch>
+            <a:fillRect/>
+          </a:stretch>
+        </p:blipFill>
+        <p:spPr>
+          <a:xfrm>
+            <a:off x="6580550" y="1369966"/>
+            <a:ext cx="5126898" cy="4011797"/>
+          </a:xfrm>
+          <a:prstGeom prst="rect">
+            <a:avLst/>
+          </a:prstGeom>
+        </p:spPr>
+      </p:pic>
+    </p:spTree>
+    <p:extLst>
+      <p:ext uri="{BB962C8B-B14F-4D97-AF65-F5344CB8AC3E}">
+        <p14:creationId xmlns:p14="http://schemas.microsoft.com/office/powerpoint/2010/main" val="70713817"/>
+      </p:ext>
+    </p:extLst>
+  </p:cSld>
+  <p:clrMapOvr>
+    <a:masterClrMapping/>
+  </p:clrMapOvr>
+</p:sld>
+</file>
+
+<file path=ppt/slides/slide11.xml><?xml version="1.0" encoding="utf-8"?>
+<p:sld xmlns:a="http://schemas.openxmlformats.org/drawingml/2006/main" xmlns:r="http://schemas.openxmlformats.org/officeDocument/2006/relationships" xmlns:p="http://schemas.openxmlformats.org/presentationml/2006/main">
+  <p:cSld>
+    <p:spTree>
+      <p:nvGrpSpPr>
+        <p:cNvPr id="1" name=""/>
+        <p:cNvGrpSpPr/>
+        <p:nvPr/>
+      </p:nvGrpSpPr>
+      <p:grpSpPr>
+        <a:xfrm>
+          <a:off x="0" y="0"/>
+          <a:ext cx="0" cy="0"/>
+          <a:chOff x="0" y="0"/>
+          <a:chExt cx="0" cy="0"/>
+        </a:xfrm>
+      </p:grpSpPr>
+      <p:sp>
+        <p:nvSpPr>
+          <p:cNvPr id="2" name="Заголовок 1">
+            <a:extLst>
+              <a:ext uri="{FF2B5EF4-FFF2-40B4-BE49-F238E27FC236}">
+                <a16:creationId xmlns:a16="http://schemas.microsoft.com/office/drawing/2014/main" id="{B4E2E5B6-63AC-2681-D1B4-875A1D5DAA96}"/>
+              </a:ext>
+            </a:extLst>
+          </p:cNvPr>
+          <p:cNvSpPr>
+            <a:spLocks noGrp="1"/>
+          </p:cNvSpPr>
+          <p:nvPr>
+            <p:ph type="title"/>
+          </p:nvPr>
+        </p:nvSpPr>
+        <p:spPr/>
+        <p:txBody>
+          <a:bodyPr/>
+          <a:lstStyle/>
+          <a:p>
+            <a:r>
+              <a:rPr lang="ru-RU" dirty="0"/>
+              <a:t>Структура Базы данных</a:t>
+            </a:r>
+          </a:p>
+        </p:txBody>
+      </p:sp>
+      <p:pic>
+        <p:nvPicPr>
+          <p:cNvPr id="4" name="Объект 3" descr="Изображение выглядит как текст, снимок экрана, дисплей, программное обеспечение&#10;&#10;Автоматически созданное описание">
+            <a:extLst>
+              <a:ext uri="{FF2B5EF4-FFF2-40B4-BE49-F238E27FC236}">
+                <a16:creationId xmlns:a16="http://schemas.microsoft.com/office/drawing/2014/main" id="{6E91862E-4C1D-DF3A-107B-7F14B64366BA}"/>
+              </a:ext>
+            </a:extLst>
+          </p:cNvPr>
+          <p:cNvPicPr>
+            <a:picLocks noGrp="1" noChangeAspect="1"/>
+          </p:cNvPicPr>
+          <p:nvPr>
+            <p:ph idx="1"/>
+          </p:nvPr>
+        </p:nvPicPr>
+        <p:blipFill>
+          <a:blip r:embed="rId2"/>
+          <a:stretch>
+            <a:fillRect/>
+          </a:stretch>
+        </p:blipFill>
+        <p:spPr>
+          <a:xfrm>
+            <a:off x="2314026" y="-306611"/>
+            <a:ext cx="7262682" cy="6607762"/>
+          </a:xfrm>
+        </p:spPr>
+      </p:pic>
+    </p:spTree>
+    <p:extLst>
+      <p:ext uri="{BB962C8B-B14F-4D97-AF65-F5344CB8AC3E}">
+        <p14:creationId xmlns:p14="http://schemas.microsoft.com/office/powerpoint/2010/main" val="2930380842"/>
+      </p:ext>
+    </p:extLst>
+  </p:cSld>
+  <p:clrMapOvr>
+    <a:masterClrMapping/>
+  </p:clrMapOvr>
+</p:sld>
+</file>
+
+<file path=ppt/slides/slide12.xml><?xml version="1.0" encoding="utf-8"?>
+<p:sld xmlns:a="http://schemas.openxmlformats.org/drawingml/2006/main" xmlns:r="http://schemas.openxmlformats.org/officeDocument/2006/relationships" xmlns:p="http://schemas.openxmlformats.org/presentationml/2006/main">
+  <p:cSld>
+    <p:spTree>
+      <p:nvGrpSpPr>
+        <p:cNvPr id="1" name=""/>
+        <p:cNvGrpSpPr/>
+        <p:nvPr/>
+      </p:nvGrpSpPr>
+      <p:grpSpPr>
+        <a:xfrm>
+          <a:off x="0" y="0"/>
+          <a:ext cx="0" cy="0"/>
+          <a:chOff x="0" y="0"/>
+          <a:chExt cx="0" cy="0"/>
+        </a:xfrm>
+      </p:grpSpPr>
+      <p:sp>
+        <p:nvSpPr>
+          <p:cNvPr id="2" name="Заголовок 1">
+            <a:extLst>
+              <a:ext uri="{FF2B5EF4-FFF2-40B4-BE49-F238E27FC236}">
+                <a16:creationId xmlns:a16="http://schemas.microsoft.com/office/drawing/2014/main" id="{1037A5A4-0C41-A058-C15E-DEAAFD5F76C6}"/>
+              </a:ext>
+            </a:extLst>
+          </p:cNvPr>
+          <p:cNvSpPr>
+            <a:spLocks noGrp="1"/>
+          </p:cNvSpPr>
+          <p:nvPr>
+            <p:ph type="title"/>
+          </p:nvPr>
+        </p:nvSpPr>
+        <p:spPr/>
+        <p:txBody>
+          <a:bodyPr/>
+          <a:lstStyle/>
+          <a:p>
+            <a:r>
+              <a:rPr lang="ru-RU" dirty="0"/>
+              <a:t>Заключение</a:t>
+            </a:r>
+          </a:p>
+        </p:txBody>
+      </p:sp>
+      <p:sp>
+        <p:nvSpPr>
+          <p:cNvPr id="3" name="Объект 2">
+            <a:extLst>
+              <a:ext uri="{FF2B5EF4-FFF2-40B4-BE49-F238E27FC236}">
+                <a16:creationId xmlns:a16="http://schemas.microsoft.com/office/drawing/2014/main" id="{2822BA97-9127-5E5F-94EF-BB2320F01DD6}"/>
+              </a:ext>
+            </a:extLst>
+          </p:cNvPr>
+          <p:cNvSpPr>
+            <a:spLocks noGrp="1"/>
+          </p:cNvSpPr>
+          <p:nvPr>
+            <p:ph idx="1"/>
+          </p:nvPr>
+        </p:nvSpPr>
+        <p:spPr>
+          <a:xfrm>
+            <a:off x="484552" y="2576513"/>
+            <a:ext cx="10661430" cy="4145972"/>
+          </a:xfrm>
+        </p:spPr>
+        <p:txBody>
+          <a:bodyPr vert="horz" lIns="91440" tIns="45720" rIns="91440" bIns="45720" rtlCol="0" anchor="t">
+            <a:normAutofit fontScale="85000" lnSpcReduction="20000"/>
+          </a:bodyPr>
+          <a:lstStyle/>
+          <a:p>
+            <a:r>
+              <a:rPr lang="ru-RU" sz="2800" b="1" dirty="0"/>
+              <a:t>Выводы к проекту:</a:t>
+            </a:r>
+          </a:p>
+          <a:p>
+            <a:r>
+              <a:rPr lang="ru-RU" sz="2800" dirty="0"/>
+              <a:t>Виртуальный кошелёк является удобным приложением, реализующим базовые функции управления финансами</a:t>
+            </a:r>
+            <a:endParaRPr lang="ru-RU" dirty="0">
+              <a:ea typeface="+mn-lt"/>
+              <a:cs typeface="+mn-lt"/>
+            </a:endParaRPr>
+          </a:p>
+          <a:p>
+            <a:r>
+              <a:rPr lang="ru-RU" sz="2800" dirty="0">
+                <a:ea typeface="+mn-lt"/>
+                <a:cs typeface="+mn-lt"/>
+              </a:rPr>
+              <a:t>Благодаря Виртуальному кошельку люди смогут легче достигать своих финансовых целей</a:t>
+            </a:r>
+            <a:endParaRPr lang="ru-RU" dirty="0"/>
+          </a:p>
+          <a:p>
+            <a:r>
+              <a:rPr lang="ru-RU" sz="2800" b="1" dirty="0"/>
+              <a:t>Возможности доработки: </a:t>
+            </a:r>
+            <a:endParaRPr lang="ru-RU" dirty="0"/>
+          </a:p>
+          <a:p>
+            <a:pPr marL="457200" indent="-457200">
+              <a:buChar char="•"/>
+            </a:pPr>
+            <a:r>
+              <a:rPr lang="ru-RU" sz="2800" dirty="0"/>
+              <a:t>Улучшение работы с различными валютами</a:t>
+            </a:r>
+            <a:endParaRPr lang="ru-RU" dirty="0"/>
+          </a:p>
+          <a:p>
+            <a:pPr marL="457200" indent="-457200">
+              <a:buChar char="•"/>
+            </a:pPr>
+            <a:r>
+              <a:rPr lang="ru-RU" sz="2800" dirty="0"/>
+              <a:t>Перевод средств между счетами</a:t>
+            </a:r>
+            <a:endParaRPr lang="ru-RU" dirty="0"/>
+          </a:p>
+          <a:p>
+            <a:pPr marL="457200" indent="-457200">
+              <a:buChar char="•"/>
+            </a:pPr>
+            <a:r>
+              <a:rPr lang="ru-RU" sz="2800" dirty="0"/>
+              <a:t>Улучшение интерфейса</a:t>
+            </a:r>
+            <a:endParaRPr lang="ru-RU" dirty="0"/>
+          </a:p>
+        </p:txBody>
+      </p:sp>
+    </p:spTree>
+    <p:extLst>
+      <p:ext uri="{BB962C8B-B14F-4D97-AF65-F5344CB8AC3E}">
+        <p14:creationId xmlns:p14="http://schemas.microsoft.com/office/powerpoint/2010/main" val="2067731151"/>
       </p:ext>
     </p:extLst>
   </p:cSld>
@@ -4323,7 +4870,7 @@
         <p:spPr>
           <a:xfrm>
             <a:off x="484552" y="2576513"/>
-            <a:ext cx="10869248" cy="3600450"/>
+            <a:ext cx="11016452" cy="3600450"/>
           </a:xfrm>
         </p:spPr>
         <p:txBody>
@@ -4334,7 +4881,7 @@
           <a:p>
             <a:r>
               <a:rPr lang="ru-RU" sz="2800" dirty="0"/>
-              <a:t>Идея проекта заключается в создании приложения, которое позволяет пользователям удобно управлять своими финансами. Данное приложение поможет пользователям в удобном формате отслеживать доходы и расходы, делать записи о них.</a:t>
+              <a:t>Идея проекта заключается в создании приложения, которое позволяет пользователям удобно управлять своими финансами. Данное приложение поможет пользователям в удобном формате отслеживать доходы и расходы, делать записи о них</a:t>
             </a:r>
           </a:p>
         </p:txBody>
@@ -4374,7 +4921,7 @@
           <p:cNvPr id="2" name="Заголовок 1">
             <a:extLst>
               <a:ext uri="{FF2B5EF4-FFF2-40B4-BE49-F238E27FC236}">
-                <a16:creationId xmlns:a16="http://schemas.microsoft.com/office/drawing/2014/main" id="{2376C5DE-DA2A-CEE7-B672-A1E91E80903F}"/>
+                <a16:creationId xmlns:a16="http://schemas.microsoft.com/office/drawing/2014/main" id="{64BE26A5-955F-B0E7-B27A-E2AB3D9FCF59}"/>
               </a:ext>
             </a:extLst>
           </p:cNvPr>
@@ -4392,7 +4939,7 @@
           <a:p>
             <a:r>
               <a:rPr lang="ru-RU" dirty="0"/>
-              <a:t>Реализация</a:t>
+              <a:t>Функции приложения</a:t>
             </a:r>
           </a:p>
         </p:txBody>
@@ -4402,7 +4949,7 @@
           <p:cNvPr id="3" name="Объект 2">
             <a:extLst>
               <a:ext uri="{FF2B5EF4-FFF2-40B4-BE49-F238E27FC236}">
-                <a16:creationId xmlns:a16="http://schemas.microsoft.com/office/drawing/2014/main" id="{D97C9935-4129-2854-EC44-65C047642B76}"/>
+                <a16:creationId xmlns:a16="http://schemas.microsoft.com/office/drawing/2014/main" id="{83D0E2C0-A106-A3C7-CD3C-302C29670CB5}"/>
               </a:ext>
             </a:extLst>
           </p:cNvPr>
@@ -4422,15 +4969,64 @@
           <a:p>
             <a:r>
               <a:rPr lang="ru-RU" sz="2800" dirty="0"/>
-              <a:t>Приложение Виртуальный кошелёк реализовано на языке программирования Python с помощью библиотеки PyQt5. Окна программы представляют собой отдельные классы. Также приложение включает в себя работу с базой данных sqlite3 необходимой для записи данных о пользователях.</a:t>
-            </a:r>
+              <a:t>Приложение Виртуальный кошелёк реализует следующие функции:</a:t>
+            </a:r>
+          </a:p>
+          <a:p>
+            <a:pPr marL="342900" indent="-342900">
+              <a:buChar char="•"/>
+            </a:pPr>
+            <a:r>
+              <a:rPr lang="ru-RU" sz="2800" dirty="0">
+                <a:ea typeface="+mn-lt"/>
+                <a:cs typeface="+mn-lt"/>
+              </a:rPr>
+              <a:t>Добавление различных пользователей</a:t>
+            </a:r>
+          </a:p>
+          <a:p>
+            <a:pPr marL="342900" indent="-342900">
+              <a:buChar char="•"/>
+            </a:pPr>
+            <a:r>
+              <a:rPr lang="ru-RU" sz="2800" dirty="0">
+                <a:ea typeface="+mn-lt"/>
+                <a:cs typeface="+mn-lt"/>
+              </a:rPr>
+              <a:t>Добавление, изменение, удаление финансовых счетов. </a:t>
+            </a:r>
+          </a:p>
+          <a:p>
+            <a:pPr marL="342900" indent="-342900">
+              <a:buChar char="•"/>
+            </a:pPr>
+            <a:r>
+              <a:rPr lang="ru-RU" sz="2800" dirty="0">
+                <a:ea typeface="+mn-lt"/>
+                <a:cs typeface="+mn-lt"/>
+              </a:rPr>
+              <a:t>Совершение пополнений и снятия средств со счетов. </a:t>
+            </a:r>
+          </a:p>
+          <a:p>
+            <a:pPr marL="342900" indent="-342900">
+              <a:buChar char="•"/>
+            </a:pPr>
+            <a:r>
+              <a:rPr lang="ru-RU" sz="2800" dirty="0">
+                <a:ea typeface="+mn-lt"/>
+                <a:cs typeface="+mn-lt"/>
+              </a:rPr>
+              <a:t>Просмотр истории финансовых счетов</a:t>
+            </a:r>
+            <a:endParaRPr lang="ru-RU" sz="2800" dirty="0"/>
           </a:p>
         </p:txBody>
       </p:sp>
     </p:spTree>
     <p:extLst>
       <p:ext uri="{BB962C8B-B14F-4D97-AF65-F5344CB8AC3E}">
-        <p14:creationId xmlns:p14="http://schemas.microsoft.com/office/powerpoint/2010/main" val="3283872042"/>
+        <p14:creationId xmlns:p14="http://schemas.microsoft.com/office/powerpoint/2010/main" val="748612217"/>
       </p:ext>
     </p:extLst>
   </p:cSld>
@@ -4462,7 +5058,7 @@
           <p:cNvPr id="2" name="Заголовок 1">
             <a:extLst>
               <a:ext uri="{FF2B5EF4-FFF2-40B4-BE49-F238E27FC236}">
-                <a16:creationId xmlns:a16="http://schemas.microsoft.com/office/drawing/2014/main" id="{9089F188-AAFE-1305-359E-BF97DCDC4E98}"/>
+                <a16:creationId xmlns:a16="http://schemas.microsoft.com/office/drawing/2014/main" id="{2376C5DE-DA2A-CEE7-B672-A1E91E80903F}"/>
               </a:ext>
             </a:extLst>
           </p:cNvPr>
@@ -4490,7 +5086,7 @@
           <p:cNvPr id="3" name="Объект 2">
             <a:extLst>
               <a:ext uri="{FF2B5EF4-FFF2-40B4-BE49-F238E27FC236}">
-                <a16:creationId xmlns:a16="http://schemas.microsoft.com/office/drawing/2014/main" id="{84EC878B-E352-D7E7-022F-4DF661E26E2B}"/>
+                <a16:creationId xmlns:a16="http://schemas.microsoft.com/office/drawing/2014/main" id="{D97C9935-4129-2854-EC44-65C047642B76}"/>
               </a:ext>
             </a:extLst>
           </p:cNvPr>
@@ -4501,12 +5097,7 @@
             <p:ph idx="1"/>
           </p:nvPr>
         </p:nvSpPr>
-        <p:spPr>
-          <a:xfrm>
-            <a:off x="484552" y="2576513"/>
-            <a:ext cx="11129020" cy="3600450"/>
-          </a:xfrm>
-        </p:spPr>
+        <p:spPr/>
         <p:txBody>
           <a:bodyPr vert="horz" lIns="91440" tIns="45720" rIns="91440" bIns="45720" rtlCol="0" anchor="t">
             <a:normAutofit/>
@@ -4514,48 +5105,47 @@
           <a:lstStyle/>
           <a:p>
             <a:r>
-              <a:rPr lang="ru-RU" sz="2800" dirty="0">
+              <a:rPr lang="ru-RU" sz="2400" dirty="0"/>
+              <a:t>Приложение Виртуальный кошелёк реализовано на языке программирования Python с помощью библиотеки PyQt5. Окна программы представляют собой отдельные классы. Также приложение включает в себя работу с базой данных sqlite3 необходимой для записи данных о пользователях</a:t>
+            </a:r>
+          </a:p>
+          <a:p>
+            <a:r>
+              <a:rPr lang="ru-RU" sz="2400" dirty="0">
                 <a:ea typeface="+mn-lt"/>
                 <a:cs typeface="+mn-lt"/>
               </a:rPr>
-              <a:t>При создании приложения в основном использовалось технологии фреймворка PyQt5. Помимо этого были использованы такие модули, как </a:t>
-            </a:r>
-            <a:r>
-              <a:rPr lang="ru-RU" sz="2800" dirty="0" err="1">
+              <a:t>При создании приложения в основном использовалось технологии фреймворка PyQt5. Помимо этого были использованы такие встроенные модули, как </a:t>
+            </a:r>
+            <a:r>
+              <a:rPr lang="ru-RU" sz="2400" dirty="0" err="1">
                 <a:ea typeface="+mn-lt"/>
                 <a:cs typeface="+mn-lt"/>
               </a:rPr>
               <a:t>sys</a:t>
             </a:r>
             <a:r>
-              <a:rPr lang="ru-RU" sz="2800" dirty="0">
+              <a:rPr lang="ru-RU" sz="2400" dirty="0">
                 <a:ea typeface="+mn-lt"/>
                 <a:cs typeface="+mn-lt"/>
               </a:rPr>
               <a:t>, sqlite3, </a:t>
             </a:r>
             <a:r>
-              <a:rPr lang="ru-RU" sz="2800" dirty="0" err="1">
+              <a:rPr lang="ru-RU" sz="2400" dirty="0" err="1">
                 <a:ea typeface="+mn-lt"/>
                 <a:cs typeface="+mn-lt"/>
               </a:rPr>
               <a:t>datetime</a:t>
             </a:r>
-            <a:r>
-              <a:rPr lang="ru-RU" sz="2800" dirty="0">
-                <a:ea typeface="+mn-lt"/>
-                <a:cs typeface="+mn-lt"/>
-              </a:rPr>
-              <a:t>. </a:t>
-            </a:r>
-            <a:endParaRPr lang="ru-RU" dirty="0" err="1"/>
+            <a:endParaRPr lang="ru-RU" sz="2400" dirty="0" err="1"/>
           </a:p>
         </p:txBody>
       </p:sp>
     </p:spTree>
     <p:extLst>
       <p:ext uri="{BB962C8B-B14F-4D97-AF65-F5344CB8AC3E}">
-        <p14:creationId xmlns:p14="http://schemas.microsoft.com/office/powerpoint/2010/main" val="40653010"/>
+        <p14:creationId xmlns:p14="http://schemas.microsoft.com/office/powerpoint/2010/main" val="3283872042"/>
       </p:ext>
     </p:extLst>
   </p:cSld>
@@ -4568,6 +5158,14 @@
 <file path=ppt/slides/slide5.xml><?xml version="1.0" encoding="utf-8"?>
 <p:sld xmlns:a="http://schemas.openxmlformats.org/drawingml/2006/main" xmlns:r="http://schemas.openxmlformats.org/officeDocument/2006/relationships" xmlns:p="http://schemas.openxmlformats.org/presentationml/2006/main">
   <p:cSld>
+    <p:bg>
+      <p:bgPr>
+        <a:solidFill>
+          <a:schemeClr val="bg1"/>
+        </a:solidFill>
+        <a:effectLst/>
+      </p:bgPr>
+    </p:bg>
     <p:spTree>
       <p:nvGrpSpPr>
         <p:cNvPr id="1" name=""/>
@@ -4582,12 +5180,135 @@
           <a:chExt cx="0" cy="0"/>
         </a:xfrm>
       </p:grpSpPr>
+      <p:sp useBgFill="1">
+        <p:nvSpPr>
+          <p:cNvPr id="10" name="Rectangle 9">
+            <a:extLst>
+              <a:ext uri="{FF2B5EF4-FFF2-40B4-BE49-F238E27FC236}">
+                <a16:creationId xmlns:a16="http://schemas.microsoft.com/office/drawing/2014/main" id="{F06B261F-632C-43DC-8DC7-7723B368270D}"/>
+              </a:ext>
+              <a:ext uri="{C183D7F6-B498-43B3-948B-1728B52AA6E4}">
+                <adec:decorative xmlns:adec="http://schemas.microsoft.com/office/drawing/2017/decorative" val="1"/>
+              </a:ext>
+            </a:extLst>
+          </p:cNvPr>
+          <p:cNvSpPr>
+            <a:spLocks noGrp="1" noRot="1" noChangeAspect="1" noMove="1" noResize="1" noEditPoints="1" noAdjustHandles="1" noChangeArrowheads="1" noChangeShapeType="1" noTextEdit="1"/>
+          </p:cNvSpPr>
+          <p:nvPr>
+            <p:extLst>
+              <p:ext uri="{386F3935-93C4-4BCD-93E2-E3B085C9AB24}">
+                <p16:designElem xmlns:p16="http://schemas.microsoft.com/office/powerpoint/2015/main" val="1"/>
+              </p:ext>
+            </p:extLst>
+          </p:nvPr>
+        </p:nvSpPr>
+        <p:spPr>
+          <a:xfrm>
+            <a:off x="0" y="0"/>
+            <a:ext cx="12192000" cy="6858000"/>
+          </a:xfrm>
+          <a:prstGeom prst="rect">
+            <a:avLst/>
+          </a:prstGeom>
+          <a:ln>
+            <a:noFill/>
+          </a:ln>
+        </p:spPr>
+        <p:style>
+          <a:lnRef idx="2">
+            <a:schemeClr val="accent1">
+              <a:shade val="50000"/>
+            </a:schemeClr>
+          </a:lnRef>
+          <a:fillRef idx="1">
+            <a:schemeClr val="accent1"/>
+          </a:fillRef>
+          <a:effectRef idx="0">
+            <a:schemeClr val="accent1"/>
+          </a:effectRef>
+          <a:fontRef idx="minor">
+            <a:schemeClr val="lt1"/>
+          </a:fontRef>
+        </p:style>
+        <p:txBody>
+          <a:bodyPr rtlCol="0" anchor="ctr"/>
+          <a:lstStyle/>
+          <a:p>
+            <a:pPr algn="ctr"/>
+            <a:endParaRPr lang="en-US"/>
+          </a:p>
+        </p:txBody>
+      </p:sp>
+      <p:sp>
+        <p:nvSpPr>
+          <p:cNvPr id="12" name="Rectangle 11">
+            <a:extLst>
+              <a:ext uri="{FF2B5EF4-FFF2-40B4-BE49-F238E27FC236}">
+                <a16:creationId xmlns:a16="http://schemas.microsoft.com/office/drawing/2014/main" id="{4E524C7F-EE50-42C5-9434-7C78CE04445B}"/>
+              </a:ext>
+              <a:ext uri="{C183D7F6-B498-43B3-948B-1728B52AA6E4}">
+                <adec:decorative xmlns:adec="http://schemas.microsoft.com/office/drawing/2017/decorative" val="1"/>
+              </a:ext>
+            </a:extLst>
+          </p:cNvPr>
+          <p:cNvSpPr>
+            <a:spLocks noGrp="1" noRot="1" noChangeAspect="1" noMove="1" noResize="1" noEditPoints="1" noAdjustHandles="1" noChangeArrowheads="1" noChangeShapeType="1" noTextEdit="1"/>
+          </p:cNvSpPr>
+          <p:nvPr>
+            <p:extLst>
+              <p:ext uri="{386F3935-93C4-4BCD-93E2-E3B085C9AB24}">
+                <p16:designElem xmlns:p16="http://schemas.microsoft.com/office/powerpoint/2015/main" val="1"/>
+              </p:ext>
+            </p:extLst>
+          </p:nvPr>
+        </p:nvSpPr>
+        <p:spPr>
+          <a:xfrm>
+            <a:off x="0" y="0"/>
+            <a:ext cx="6095998" cy="6861333"/>
+          </a:xfrm>
+          <a:prstGeom prst="rect">
+            <a:avLst/>
+          </a:prstGeom>
+          <a:solidFill>
+            <a:schemeClr val="tx2"/>
+          </a:solidFill>
+          <a:ln>
+            <a:noFill/>
+          </a:ln>
+        </p:spPr>
+        <p:style>
+          <a:lnRef idx="2">
+            <a:schemeClr val="accent1">
+              <a:shade val="50000"/>
+            </a:schemeClr>
+          </a:lnRef>
+          <a:fillRef idx="1">
+            <a:schemeClr val="accent1"/>
+          </a:fillRef>
+          <a:effectRef idx="0">
+            <a:schemeClr val="accent1"/>
+          </a:effectRef>
+          <a:fontRef idx="minor">
+            <a:schemeClr val="lt1"/>
+          </a:fontRef>
+        </p:style>
+        <p:txBody>
+          <a:bodyPr rtlCol="0" anchor="ctr"/>
+          <a:lstStyle/>
+          <a:p>
+            <a:pPr algn="ctr"/>
+            <a:endParaRPr lang="en-US"/>
+          </a:p>
+        </p:txBody>
+      </p:sp>
       <p:sp>
         <p:nvSpPr>
           <p:cNvPr id="2" name="Заголовок 1">
             <a:extLst>
               <a:ext uri="{FF2B5EF4-FFF2-40B4-BE49-F238E27FC236}">
-                <a16:creationId xmlns:a16="http://schemas.microsoft.com/office/drawing/2014/main" id="{64BE26A5-955F-B0E7-B27A-E2AB3D9FCF59}"/>
+                <a16:creationId xmlns:a16="http://schemas.microsoft.com/office/drawing/2014/main" id="{A16C180B-3EC5-FBEC-9674-A22A0C95B1F4}"/>
               </a:ext>
             </a:extLst>
           </p:cNvPr>
@@ -4598,14 +5319,21 @@
             <p:ph type="title"/>
           </p:nvPr>
         </p:nvSpPr>
-        <p:spPr/>
-        <p:txBody>
-          <a:bodyPr/>
+        <p:spPr>
+          <a:xfrm>
+            <a:off x="484552" y="365125"/>
+            <a:ext cx="5022630" cy="2430030"/>
+          </a:xfrm>
+        </p:spPr>
+        <p:txBody>
+          <a:bodyPr>
+            <a:normAutofit/>
+          </a:bodyPr>
           <a:lstStyle/>
           <a:p>
             <a:r>
               <a:rPr lang="ru-RU" dirty="0"/>
-              <a:t>Функции приложения</a:t>
+              <a:t>Основные классы</a:t>
             </a:r>
           </a:p>
         </p:txBody>
@@ -4615,7 +5343,7 @@
           <p:cNvPr id="3" name="Объект 2">
             <a:extLst>
               <a:ext uri="{FF2B5EF4-FFF2-40B4-BE49-F238E27FC236}">
-                <a16:creationId xmlns:a16="http://schemas.microsoft.com/office/drawing/2014/main" id="{83D0E2C0-A106-A3C7-CD3C-302C29670CB5}"/>
+                <a16:creationId xmlns:a16="http://schemas.microsoft.com/office/drawing/2014/main" id="{A861AE86-7BE5-8D99-AFA0-3908E73BD050}"/>
               </a:ext>
             </a:extLst>
           </p:cNvPr>
@@ -4626,7 +5354,12 @@
             <p:ph idx="1"/>
           </p:nvPr>
         </p:nvSpPr>
-        <p:spPr/>
+        <p:spPr>
+          <a:xfrm>
+            <a:off x="484552" y="3054927"/>
+            <a:ext cx="4683964" cy="3122036"/>
+          </a:xfrm>
+        </p:spPr>
         <p:txBody>
           <a:bodyPr vert="horz" lIns="91440" tIns="45720" rIns="91440" bIns="45720" rtlCol="0" anchor="t">
             <a:normAutofit/>
@@ -4634,65 +5367,66 @@
           <a:lstStyle/>
           <a:p>
             <a:r>
-              <a:rPr lang="ru-RU" sz="2800" dirty="0"/>
-              <a:t>Приложение Виртуальный кошелёк реализует следующие функции:</a:t>
-            </a:r>
-          </a:p>
-          <a:p>
-            <a:pPr marL="342900" indent="-342900">
-              <a:buChar char="•"/>
-            </a:pPr>
-            <a:r>
-              <a:rPr lang="ru-RU" sz="2800" dirty="0">
-                <a:ea typeface="+mn-lt"/>
-                <a:cs typeface="+mn-lt"/>
+              <a:rPr lang="ru-RU" dirty="0">
+                <a:solidFill>
+                  <a:schemeClr val="bg1"/>
+                </a:solidFill>
               </a:rPr>
-              <a:t>Добавление различных пользователей</a:t>
-            </a:r>
-          </a:p>
-          <a:p>
-            <a:pPr marL="342900" indent="-342900">
-              <a:buChar char="•"/>
-            </a:pPr>
-            <a:r>
-              <a:rPr lang="ru-RU" sz="2800" dirty="0">
-                <a:ea typeface="+mn-lt"/>
-                <a:cs typeface="+mn-lt"/>
+              <a:t>Окно класса </a:t>
+            </a:r>
+            <a:r>
+              <a:rPr lang="ru-RU" err="1">
+                <a:solidFill>
+                  <a:schemeClr val="bg1"/>
+                </a:solidFill>
               </a:rPr>
-              <a:t>Добавление, изменение, удаление финансовых счетов. </a:t>
-            </a:r>
-          </a:p>
-          <a:p>
-            <a:pPr marL="342900" indent="-342900">
-              <a:buChar char="•"/>
-            </a:pPr>
-            <a:r>
-              <a:rPr lang="ru-RU" sz="2800" dirty="0">
-                <a:ea typeface="+mn-lt"/>
-                <a:cs typeface="+mn-lt"/>
+              <a:t>LoginPage</a:t>
+            </a:r>
+            <a:r>
+              <a:rPr lang="ru-RU" dirty="0">
+                <a:solidFill>
+                  <a:schemeClr val="bg1"/>
+                </a:solidFill>
               </a:rPr>
-              <a:t>Совершение платежей и снятие средств со счетов. </a:t>
-            </a:r>
-          </a:p>
-          <a:p>
-            <a:pPr marL="342900" indent="-342900">
-              <a:buChar char="•"/>
-            </a:pPr>
-            <a:r>
-              <a:rPr lang="ru-RU" sz="2800" dirty="0">
-                <a:ea typeface="+mn-lt"/>
-                <a:cs typeface="+mn-lt"/>
-              </a:rPr>
-              <a:t>Просмотр истории финансовых счетов</a:t>
-            </a:r>
-            <a:endParaRPr lang="ru-RU" sz="2800" dirty="0"/>
-          </a:p>
-        </p:txBody>
-      </p:sp>
+              <a:t> является приветствующим. С помощью него можно либо войти в аккаунт, либо добавить пользователя</a:t>
+            </a:r>
+          </a:p>
+        </p:txBody>
+      </p:sp>
+      <p:pic>
+        <p:nvPicPr>
+          <p:cNvPr id="5" name="Рисунок 4">
+            <a:extLst>
+              <a:ext uri="{FF2B5EF4-FFF2-40B4-BE49-F238E27FC236}">
+                <a16:creationId xmlns:a16="http://schemas.microsoft.com/office/drawing/2014/main" id="{DCD06957-06E4-37C0-AB1F-32A35F72BE3C}"/>
+              </a:ext>
+            </a:extLst>
+          </p:cNvPr>
+          <p:cNvPicPr>
+            <a:picLocks noChangeAspect="1"/>
+          </p:cNvPicPr>
+          <p:nvPr/>
+        </p:nvPicPr>
+        <p:blipFill>
+          <a:blip r:embed="rId2"/>
+          <a:stretch>
+            <a:fillRect/>
+          </a:stretch>
+        </p:blipFill>
+        <p:spPr>
+          <a:xfrm>
+            <a:off x="6580550" y="1363557"/>
+            <a:ext cx="5126898" cy="4024614"/>
+          </a:xfrm>
+          <a:prstGeom prst="rect">
+            <a:avLst/>
+          </a:prstGeom>
+        </p:spPr>
+      </p:pic>
     </p:spTree>
     <p:extLst>
       <p:ext uri="{BB962C8B-B14F-4D97-AF65-F5344CB8AC3E}">
-        <p14:creationId xmlns:p14="http://schemas.microsoft.com/office/powerpoint/2010/main" val="748612217"/>
+        <p14:creationId xmlns:p14="http://schemas.microsoft.com/office/powerpoint/2010/main" val="4211460535"/>
       </p:ext>
     </p:extLst>
   </p:cSld>
@@ -4909,20 +5643,20 @@
         </p:spPr>
         <p:txBody>
           <a:bodyPr vert="horz" lIns="91440" tIns="45720" rIns="91440" bIns="45720" rtlCol="0" anchor="t">
-            <a:normAutofit/>
+            <a:noAutofit/>
           </a:bodyPr>
           <a:lstStyle/>
           <a:p>
             <a:r>
-              <a:rPr lang="ru-RU" sz="1800" dirty="0">
+              <a:rPr lang="ru-RU" dirty="0">
                 <a:solidFill>
                   <a:schemeClr val="bg1"/>
                 </a:solidFill>
               </a:rPr>
-              <a:t>Класс </a:t>
-            </a:r>
-            <a:r>
-              <a:rPr lang="ru-RU" sz="1800" dirty="0" err="1">
+              <a:t>Окно класса </a:t>
+            </a:r>
+            <a:r>
+              <a:rPr lang="ru-RU" err="1">
                 <a:solidFill>
                   <a:schemeClr val="bg1"/>
                 </a:solidFill>
@@ -4930,22 +5664,22 @@
               <a:t>MainPage</a:t>
             </a:r>
             <a:r>
-              <a:rPr lang="ru-RU" sz="1800" dirty="0">
+              <a:rPr lang="ru-RU" dirty="0">
                 <a:solidFill>
                   <a:schemeClr val="bg1"/>
                 </a:solidFill>
               </a:rPr>
-              <a:t> является основным. С его помощью осуществляется навигация по всем окнам приложения.</a:t>
-            </a:r>
-          </a:p>
-          <a:p>
-            <a:r>
-              <a:rPr lang="ru-RU" sz="1800" dirty="0">
+              <a:t> является основным. С его помощью осуществляется навигация по всем окнам приложения</a:t>
+            </a:r>
+          </a:p>
+          <a:p>
+            <a:r>
+              <a:rPr lang="ru-RU" dirty="0">
                 <a:solidFill>
                   <a:schemeClr val="bg1"/>
                 </a:solidFill>
               </a:rPr>
-              <a:t>На данном окне отображается информация о всех счетах пользователя, кнопки смены пользователя, управления счетами, просмотра истории и манипуляции средствами.</a:t>
+              <a:t>На данном окне отображается информация о всех счетах пользователя, кнопки смены пользователя, управления счетами, просмотра истории и манипуляции средствами</a:t>
             </a:r>
           </a:p>
           <a:p>
@@ -5027,7 +5761,7 @@
       </p:grpSpPr>
       <p:sp useBgFill="1">
         <p:nvSpPr>
-          <p:cNvPr id="10" name="Rectangle 9">
+          <p:cNvPr id="9" name="Rectangle 8">
             <a:extLst>
               <a:ext uri="{FF2B5EF4-FFF2-40B4-BE49-F238E27FC236}">
                 <a16:creationId xmlns:a16="http://schemas.microsoft.com/office/drawing/2014/main" id="{F06B261F-632C-43DC-8DC7-7723B368270D}"/>
@@ -5087,7 +5821,7 @@
       </p:sp>
       <p:sp>
         <p:nvSpPr>
-          <p:cNvPr id="12" name="Rectangle 11">
+          <p:cNvPr id="11" name="Rectangle 10">
             <a:extLst>
               <a:ext uri="{FF2B5EF4-FFF2-40B4-BE49-F238E27FC236}">
                 <a16:creationId xmlns:a16="http://schemas.microsoft.com/office/drawing/2014/main" id="{4E524C7F-EE50-42C5-9434-7C78CE04445B}"/>
@@ -5153,7 +5887,7 @@
           <p:cNvPr id="2" name="Заголовок 1">
             <a:extLst>
               <a:ext uri="{FF2B5EF4-FFF2-40B4-BE49-F238E27FC236}">
-                <a16:creationId xmlns:a16="http://schemas.microsoft.com/office/drawing/2014/main" id="{A16C180B-3EC5-FBEC-9674-A22A0C95B1F4}"/>
+                <a16:creationId xmlns:a16="http://schemas.microsoft.com/office/drawing/2014/main" id="{7AC0B835-9FFD-035E-9A8B-1B25BF8FE92A}"/>
               </a:ext>
             </a:extLst>
           </p:cNvPr>
@@ -5188,7 +5922,7 @@
           <p:cNvPr id="3" name="Объект 2">
             <a:extLst>
               <a:ext uri="{FF2B5EF4-FFF2-40B4-BE49-F238E27FC236}">
-                <a16:creationId xmlns:a16="http://schemas.microsoft.com/office/drawing/2014/main" id="{A861AE86-7BE5-8D99-AFA0-3908E73BD050}"/>
+                <a16:creationId xmlns:a16="http://schemas.microsoft.com/office/drawing/2014/main" id="{C7F662E4-4B3A-7EB2-D013-B4E62BF9BEB7}"/>
               </a:ext>
             </a:extLst>
           </p:cNvPr>
@@ -5206,28 +5940,82 @@
           </a:xfrm>
         </p:spPr>
         <p:txBody>
-          <a:bodyPr vert="horz" lIns="91440" tIns="45720" rIns="91440" bIns="45720" rtlCol="0">
+          <a:bodyPr vert="horz" lIns="91440" tIns="45720" rIns="91440" bIns="45720" rtlCol="0" anchor="t">
             <a:normAutofit/>
           </a:bodyPr>
           <a:lstStyle/>
           <a:p>
             <a:r>
-              <a:rPr lang="ru-RU" sz="1800">
+              <a:rPr lang="ru-RU" dirty="0">
                 <a:solidFill>
                   <a:schemeClr val="bg1"/>
                 </a:solidFill>
               </a:rPr>
-              <a:t>Класс окна LoginPage является приветствующим. С помощью него можно либо войти в аккаунт, либо добавить пользователя.</a:t>
+              <a:t>Окно класса </a:t>
+            </a:r>
+            <a:r>
+              <a:rPr lang="ru-RU" dirty="0" err="1">
+                <a:solidFill>
+                  <a:schemeClr val="bg1"/>
+                </a:solidFill>
+                <a:ea typeface="+mn-lt"/>
+                <a:cs typeface="+mn-lt"/>
+              </a:rPr>
+              <a:t>ManipulateAccountsPage</a:t>
+            </a:r>
+            <a:r>
+              <a:rPr lang="ru-RU" dirty="0">
+                <a:solidFill>
+                  <a:schemeClr val="bg1"/>
+                </a:solidFill>
+                <a:ea typeface="+mn-lt"/>
+                <a:cs typeface="+mn-lt"/>
+              </a:rPr>
+              <a:t> Отвечает</a:t>
+            </a:r>
+            <a:r>
+              <a:rPr lang="ru-RU" dirty="0">
+                <a:solidFill>
+                  <a:schemeClr val="bg1"/>
+                </a:solidFill>
+              </a:rPr>
+              <a:t> за добавление, удаление и изменение финансовых счетов</a:t>
+            </a:r>
+          </a:p>
+          <a:p>
+            <a:r>
+              <a:rPr lang="ru-RU" dirty="0">
+                <a:solidFill>
+                  <a:schemeClr val="bg1"/>
+                </a:solidFill>
+              </a:rPr>
+              <a:t>Основным виджетом данного окна является </a:t>
+            </a:r>
+            <a:r>
+              <a:rPr lang="ru-RU" err="1">
+                <a:solidFill>
+                  <a:schemeClr val="bg1"/>
+                </a:solidFill>
+              </a:rPr>
+              <a:t>QListWidget</a:t>
+            </a:r>
+            <a:r>
+              <a:rPr lang="ru-RU" dirty="0">
+                <a:solidFill>
+                  <a:schemeClr val="bg1"/>
+                </a:solidFill>
+              </a:rPr>
+              <a:t> отображающий счета текущего пользователя</a:t>
             </a:r>
           </a:p>
         </p:txBody>
       </p:sp>
       <p:pic>
         <p:nvPicPr>
-          <p:cNvPr id="5" name="Рисунок 4">
-            <a:extLst>
-              <a:ext uri="{FF2B5EF4-FFF2-40B4-BE49-F238E27FC236}">
-                <a16:creationId xmlns:a16="http://schemas.microsoft.com/office/drawing/2014/main" id="{DCD06957-06E4-37C0-AB1F-32A35F72BE3C}"/>
+          <p:cNvPr id="4" name="Рисунок 3" descr="Изображение выглядит как текст, снимок экрана, Шрифт, дизайн&#10;&#10;Автоматически созданное описание">
+            <a:extLst>
+              <a:ext uri="{FF2B5EF4-FFF2-40B4-BE49-F238E27FC236}">
+                <a16:creationId xmlns:a16="http://schemas.microsoft.com/office/drawing/2014/main" id="{2A423135-D479-1D39-55BD-F2101220666C}"/>
               </a:ext>
             </a:extLst>
           </p:cNvPr>
@@ -5244,8 +6032,8 @@
         </p:blipFill>
         <p:spPr>
           <a:xfrm>
-            <a:off x="6580550" y="1363557"/>
-            <a:ext cx="5126898" cy="4024614"/>
+            <a:off x="6580550" y="1369966"/>
+            <a:ext cx="5126898" cy="4011797"/>
           </a:xfrm>
           <a:prstGeom prst="rect">
             <a:avLst/>
@@ -5255,7 +6043,7 @@
     </p:spTree>
     <p:extLst>
       <p:ext uri="{BB962C8B-B14F-4D97-AF65-F5344CB8AC3E}">
-        <p14:creationId xmlns:p14="http://schemas.microsoft.com/office/powerpoint/2010/main" val="4211460535"/>
+        <p14:creationId xmlns:p14="http://schemas.microsoft.com/office/powerpoint/2010/main" val="3535596035"/>
       </p:ext>
     </p:extLst>
   </p:cSld>
@@ -5292,7 +6080,7 @@
       </p:grpSpPr>
       <p:sp useBgFill="1">
         <p:nvSpPr>
-          <p:cNvPr id="9" name="Rectangle 8">
+          <p:cNvPr id="19" name="Rectangle 8">
             <a:extLst>
               <a:ext uri="{FF2B5EF4-FFF2-40B4-BE49-F238E27FC236}">
                 <a16:creationId xmlns:a16="http://schemas.microsoft.com/office/drawing/2014/main" id="{F06B261F-632C-43DC-8DC7-7723B368270D}"/>
@@ -5352,7 +6140,7 @@
       </p:sp>
       <p:sp>
         <p:nvSpPr>
-          <p:cNvPr id="11" name="Rectangle 10">
+          <p:cNvPr id="20" name="Rectangle 10">
             <a:extLst>
               <a:ext uri="{FF2B5EF4-FFF2-40B4-BE49-F238E27FC236}">
                 <a16:creationId xmlns:a16="http://schemas.microsoft.com/office/drawing/2014/main" id="{4E524C7F-EE50-42C5-9434-7C78CE04445B}"/>
@@ -5418,7 +6206,7 @@
           <p:cNvPr id="2" name="Заголовок 1">
             <a:extLst>
               <a:ext uri="{FF2B5EF4-FFF2-40B4-BE49-F238E27FC236}">
-                <a16:creationId xmlns:a16="http://schemas.microsoft.com/office/drawing/2014/main" id="{7AC0B835-9FFD-035E-9A8B-1B25BF8FE92A}"/>
+                <a16:creationId xmlns:a16="http://schemas.microsoft.com/office/drawing/2014/main" id="{30E529EA-BD87-CA81-347C-D09F15DA9CB4}"/>
               </a:ext>
             </a:extLst>
           </p:cNvPr>
@@ -5453,7 +6241,7 @@
           <p:cNvPr id="3" name="Объект 2">
             <a:extLst>
               <a:ext uri="{FF2B5EF4-FFF2-40B4-BE49-F238E27FC236}">
-                <a16:creationId xmlns:a16="http://schemas.microsoft.com/office/drawing/2014/main" id="{C7F662E4-4B3A-7EB2-D013-B4E62BF9BEB7}"/>
+                <a16:creationId xmlns:a16="http://schemas.microsoft.com/office/drawing/2014/main" id="{F6A9CED7-0819-48F9-BBF3-CDC803453A1E}"/>
               </a:ext>
             </a:extLst>
           </p:cNvPr>
@@ -5471,56 +6259,88 @@
           </a:xfrm>
         </p:spPr>
         <p:txBody>
-          <a:bodyPr vert="horz" lIns="91440" tIns="45720" rIns="91440" bIns="45720" rtlCol="0">
+          <a:bodyPr vert="horz" lIns="91440" tIns="45720" rIns="91440" bIns="45720" rtlCol="0" anchor="t">
             <a:normAutofit/>
           </a:bodyPr>
           <a:lstStyle/>
           <a:p>
             <a:r>
-              <a:rPr lang="ru-RU" sz="1800">
+              <a:rPr lang="ru-RU" dirty="0">
                 <a:solidFill>
                   <a:schemeClr val="bg1"/>
                 </a:solidFill>
               </a:rPr>
-              <a:t>Класс окна </a:t>
-            </a:r>
-            <a:r>
-              <a:rPr lang="ru-RU" sz="1800">
+              <a:t>Окно класса </a:t>
+            </a:r>
+            <a:r>
+              <a:rPr lang="ru-RU" dirty="0" err="1">
+                <a:solidFill>
+                  <a:schemeClr val="bg1"/>
+                </a:solidFill>
+              </a:rPr>
+              <a:t>HistoryShowPage</a:t>
+            </a:r>
+            <a:r>
+              <a:rPr lang="ru-RU" dirty="0">
+                <a:solidFill>
+                  <a:schemeClr val="bg1"/>
+                </a:solidFill>
+              </a:rPr>
+              <a:t> служит для отображения информации о пополнениях</a:t>
+            </a:r>
+            <a:r>
+              <a:rPr lang="ru-RU" dirty="0">
                 <a:solidFill>
                   <a:schemeClr val="bg1"/>
                 </a:solidFill>
                 <a:ea typeface="+mn-lt"/>
                 <a:cs typeface="+mn-lt"/>
               </a:rPr>
-              <a:t>ManipulateAccountsPage Отвечает</a:t>
-            </a:r>
-            <a:r>
-              <a:rPr lang="ru-RU" sz="1800">
+              <a:t> и снятия средств</a:t>
+            </a:r>
+            <a:r>
+              <a:rPr lang="ru-RU" dirty="0">
                 <a:solidFill>
                   <a:schemeClr val="bg1"/>
                 </a:solidFill>
               </a:rPr>
-              <a:t> за добавление, удаление и изменение финансовых счетов. </a:t>
-            </a:r>
-          </a:p>
-          <a:p>
-            <a:r>
-              <a:rPr lang="ru-RU" sz="1800">
+              <a:t> со счёта</a:t>
+            </a:r>
+          </a:p>
+          <a:p>
+            <a:r>
+              <a:rPr lang="ru-RU" dirty="0">
                 <a:solidFill>
                   <a:schemeClr val="bg1"/>
                 </a:solidFill>
               </a:rPr>
-              <a:t>Основным виджетом данного окна является QListWidget отображающий счета текущего пользователя</a:t>
+              <a:t>В таблице </a:t>
+            </a:r>
+            <a:r>
+              <a:rPr lang="ru-RU" err="1">
+                <a:solidFill>
+                  <a:schemeClr val="bg1"/>
+                </a:solidFill>
+              </a:rPr>
+              <a:t>QTableWidget</a:t>
+            </a:r>
+            <a:r>
+              <a:rPr lang="ru-RU" dirty="0">
+                <a:solidFill>
+                  <a:schemeClr val="bg1"/>
+                </a:solidFill>
+              </a:rPr>
+              <a:t> отображаются: Источник/Цель, сумма и дата совершения операции</a:t>
             </a:r>
           </a:p>
         </p:txBody>
       </p:sp>
       <p:pic>
         <p:nvPicPr>
-          <p:cNvPr id="4" name="Рисунок 3" descr="Изображение выглядит как текст, снимок экрана, Шрифт, дизайн&#10;&#10;Автоматически созданное описание">
-            <a:extLst>
-              <a:ext uri="{FF2B5EF4-FFF2-40B4-BE49-F238E27FC236}">
-                <a16:creationId xmlns:a16="http://schemas.microsoft.com/office/drawing/2014/main" id="{2A423135-D479-1D39-55BD-F2101220666C}"/>
+          <p:cNvPr id="4" name="Рисунок 3" descr="Изображение выглядит как текст, снимок экрана, Шрифт&#10;&#10;Автоматически созданное описание">
+            <a:extLst>
+              <a:ext uri="{FF2B5EF4-FFF2-40B4-BE49-F238E27FC236}">
+                <a16:creationId xmlns:a16="http://schemas.microsoft.com/office/drawing/2014/main" id="{3AC6F4EB-DD88-029C-5A11-211231268097}"/>
               </a:ext>
             </a:extLst>
           </p:cNvPr>
@@ -5548,7 +6368,7 @@
     </p:spTree>
     <p:extLst>
       <p:ext uri="{BB962C8B-B14F-4D97-AF65-F5344CB8AC3E}">
-        <p14:creationId xmlns:p14="http://schemas.microsoft.com/office/powerpoint/2010/main" val="3535596035"/>
+        <p14:creationId xmlns:p14="http://schemas.microsoft.com/office/powerpoint/2010/main" val="1757801773"/>
       </p:ext>
     </p:extLst>
   </p:cSld>
@@ -5561,6 +6381,14 @@
 <file path=ppt/slides/slide9.xml><?xml version="1.0" encoding="utf-8"?>
 <p:sld xmlns:a="http://schemas.openxmlformats.org/drawingml/2006/main" xmlns:r="http://schemas.openxmlformats.org/officeDocument/2006/relationships" xmlns:p="http://schemas.openxmlformats.org/presentationml/2006/main">
   <p:cSld>
+    <p:bg>
+      <p:bgPr>
+        <a:solidFill>
+          <a:schemeClr val="bg1"/>
+        </a:solidFill>
+        <a:effectLst/>
+      </p:bgPr>
+    </p:bg>
     <p:spTree>
       <p:nvGrpSpPr>
         <p:cNvPr id="1" name=""/>
@@ -5575,12 +6403,174 @@
           <a:chExt cx="0" cy="0"/>
         </a:xfrm>
       </p:grpSpPr>
+      <p:sp useBgFill="1">
+        <p:nvSpPr>
+          <p:cNvPr id="8" name="Rectangle 10">
+            <a:extLst>
+              <a:ext uri="{FF2B5EF4-FFF2-40B4-BE49-F238E27FC236}">
+                <a16:creationId xmlns:a16="http://schemas.microsoft.com/office/drawing/2014/main" id="{F06B261F-632C-43DC-8DC7-7723B368270D}"/>
+              </a:ext>
+              <a:ext uri="{C183D7F6-B498-43B3-948B-1728B52AA6E4}">
+                <adec:decorative xmlns:adec="http://schemas.microsoft.com/office/drawing/2017/decorative" val="1"/>
+              </a:ext>
+            </a:extLst>
+          </p:cNvPr>
+          <p:cNvSpPr>
+            <a:spLocks noGrp="1" noRot="1" noChangeAspect="1" noMove="1" noResize="1" noEditPoints="1" noAdjustHandles="1" noChangeArrowheads="1" noChangeShapeType="1" noTextEdit="1"/>
+          </p:cNvSpPr>
+          <p:nvPr>
+            <p:extLst>
+              <p:ext uri="{386F3935-93C4-4BCD-93E2-E3B085C9AB24}">
+                <p16:designElem xmlns:p16="http://schemas.microsoft.com/office/powerpoint/2015/main" val="1"/>
+              </p:ext>
+            </p:extLst>
+          </p:nvPr>
+        </p:nvSpPr>
+        <p:spPr>
+          <a:xfrm>
+            <a:off x="0" y="0"/>
+            <a:ext cx="12192000" cy="6858000"/>
+          </a:xfrm>
+          <a:prstGeom prst="rect">
+            <a:avLst/>
+          </a:prstGeom>
+          <a:ln>
+            <a:noFill/>
+          </a:ln>
+        </p:spPr>
+        <p:style>
+          <a:lnRef idx="2">
+            <a:schemeClr val="accent1">
+              <a:shade val="50000"/>
+            </a:schemeClr>
+          </a:lnRef>
+          <a:fillRef idx="1">
+            <a:schemeClr val="accent1"/>
+          </a:fillRef>
+          <a:effectRef idx="0">
+            <a:schemeClr val="accent1"/>
+          </a:effectRef>
+          <a:fontRef idx="minor">
+            <a:schemeClr val="lt1"/>
+          </a:fontRef>
+        </p:style>
+        <p:txBody>
+          <a:bodyPr rtlCol="0" anchor="ctr"/>
+          <a:lstStyle/>
+          <a:p>
+            <a:pPr algn="ctr"/>
+            <a:endParaRPr lang="en-US"/>
+          </a:p>
+        </p:txBody>
+      </p:sp>
+      <p:sp>
+        <p:nvSpPr>
+          <p:cNvPr id="9" name="Rectangle 12">
+            <a:extLst>
+              <a:ext uri="{FF2B5EF4-FFF2-40B4-BE49-F238E27FC236}">
+                <a16:creationId xmlns:a16="http://schemas.microsoft.com/office/drawing/2014/main" id="{4E524C7F-EE50-42C5-9434-7C78CE04445B}"/>
+              </a:ext>
+              <a:ext uri="{C183D7F6-B498-43B3-948B-1728B52AA6E4}">
+                <adec:decorative xmlns:adec="http://schemas.microsoft.com/office/drawing/2017/decorative" val="1"/>
+              </a:ext>
+            </a:extLst>
+          </p:cNvPr>
+          <p:cNvSpPr>
+            <a:spLocks noGrp="1" noRot="1" noChangeAspect="1" noMove="1" noResize="1" noEditPoints="1" noAdjustHandles="1" noChangeArrowheads="1" noChangeShapeType="1" noTextEdit="1"/>
+          </p:cNvSpPr>
+          <p:nvPr>
+            <p:extLst>
+              <p:ext uri="{386F3935-93C4-4BCD-93E2-E3B085C9AB24}">
+                <p16:designElem xmlns:p16="http://schemas.microsoft.com/office/powerpoint/2015/main" val="1"/>
+              </p:ext>
+            </p:extLst>
+          </p:nvPr>
+        </p:nvSpPr>
+        <p:spPr>
+          <a:xfrm>
+            <a:off x="0" y="0"/>
+            <a:ext cx="6083644" cy="6861333"/>
+          </a:xfrm>
+          <a:prstGeom prst="rect">
+            <a:avLst/>
+          </a:prstGeom>
+          <a:solidFill>
+            <a:schemeClr val="tx2"/>
+          </a:solidFill>
+          <a:ln>
+            <a:noFill/>
+          </a:ln>
+        </p:spPr>
+        <p:style>
+          <a:lnRef idx="2">
+            <a:schemeClr val="accent1">
+              <a:shade val="50000"/>
+            </a:schemeClr>
+          </a:lnRef>
+          <a:fillRef idx="1">
+            <a:schemeClr val="accent1"/>
+          </a:fillRef>
+          <a:effectRef idx="0">
+            <a:schemeClr val="accent1"/>
+          </a:effectRef>
+          <a:fontRef idx="minor">
+            <a:schemeClr val="lt1"/>
+          </a:fontRef>
+        </p:style>
+        <p:txBody>
+          <a:bodyPr rtlCol="0" anchor="ctr"/>
+          <a:lstStyle/>
+          <a:p>
+            <a:pPr algn="ctr"/>
+            <a:endParaRPr lang="en-US"/>
+          </a:p>
+        </p:txBody>
+      </p:sp>
+      <p:cxnSp>
+        <p:nvCxnSpPr>
+          <p:cNvPr id="12" name="Прямая со стрелкой 11">
+            <a:extLst>
+              <a:ext uri="{FF2B5EF4-FFF2-40B4-BE49-F238E27FC236}">
+                <a16:creationId xmlns:a16="http://schemas.microsoft.com/office/drawing/2014/main" id="{258EE39B-2894-0A9E-D256-F4FEFC160766}"/>
+              </a:ext>
+            </a:extLst>
+          </p:cNvPr>
+          <p:cNvCxnSpPr/>
+          <p:nvPr/>
+        </p:nvCxnSpPr>
+        <p:spPr>
+          <a:xfrm>
+            <a:off x="3512993" y="3677516"/>
+            <a:ext cx="3624694" cy="1104899"/>
+          </a:xfrm>
+          <a:prstGeom prst="straightConnector1">
+            <a:avLst/>
+          </a:prstGeom>
+          <a:ln w="57150">
+            <a:tailEnd type="triangle"/>
+          </a:ln>
+        </p:spPr>
+        <p:style>
+          <a:lnRef idx="1">
+            <a:schemeClr val="accent1"/>
+          </a:lnRef>
+          <a:fillRef idx="0">
+            <a:schemeClr val="accent1"/>
+          </a:fillRef>
+          <a:effectRef idx="0">
+            <a:schemeClr val="accent1"/>
+          </a:effectRef>
+          <a:fontRef idx="minor">
+            <a:schemeClr val="tx1"/>
+          </a:fontRef>
+        </p:style>
+      </p:cxnSp>
       <p:sp>
         <p:nvSpPr>
           <p:cNvPr id="2" name="Заголовок 1">
             <a:extLst>
               <a:ext uri="{FF2B5EF4-FFF2-40B4-BE49-F238E27FC236}">
-                <a16:creationId xmlns:a16="http://schemas.microsoft.com/office/drawing/2014/main" id="{1037A5A4-0C41-A058-C15E-DEAAFD5F76C6}"/>
+                <a16:creationId xmlns:a16="http://schemas.microsoft.com/office/drawing/2014/main" id="{E1221D22-0B9A-2DD4-FC7C-1F3F748348B5}"/>
               </a:ext>
             </a:extLst>
           </p:cNvPr>
@@ -5591,14 +6581,21 @@
             <p:ph type="title"/>
           </p:nvPr>
         </p:nvSpPr>
-        <p:spPr/>
-        <p:txBody>
-          <a:bodyPr/>
+        <p:spPr>
+          <a:xfrm>
+            <a:off x="484552" y="365125"/>
+            <a:ext cx="5022630" cy="2430030"/>
+          </a:xfrm>
+        </p:spPr>
+        <p:txBody>
+          <a:bodyPr>
+            <a:normAutofit/>
+          </a:bodyPr>
           <a:lstStyle/>
           <a:p>
             <a:r>
               <a:rPr lang="ru-RU" dirty="0"/>
-              <a:t>Заключение</a:t>
+              <a:t>Основные классы</a:t>
             </a:r>
           </a:p>
         </p:txBody>
@@ -5608,7 +6605,7 @@
           <p:cNvPr id="3" name="Объект 2">
             <a:extLst>
               <a:ext uri="{FF2B5EF4-FFF2-40B4-BE49-F238E27FC236}">
-                <a16:creationId xmlns:a16="http://schemas.microsoft.com/office/drawing/2014/main" id="{2822BA97-9127-5E5F-94EF-BB2320F01DD6}"/>
+                <a16:creationId xmlns:a16="http://schemas.microsoft.com/office/drawing/2014/main" id="{673104FA-3F92-F85B-5F8B-EDEDD2C3BD84}"/>
               </a:ext>
             </a:extLst>
           </p:cNvPr>
@@ -5621,84 +6618,208 @@
         </p:nvSpPr>
         <p:spPr>
           <a:xfrm>
-            <a:off x="484552" y="2576513"/>
-            <a:ext cx="10661430" cy="4145972"/>
+            <a:off x="484552" y="3054927"/>
+            <a:ext cx="5022630" cy="3122036"/>
           </a:xfrm>
         </p:spPr>
         <p:txBody>
           <a:bodyPr vert="horz" lIns="91440" tIns="45720" rIns="91440" bIns="45720" rtlCol="0" anchor="t">
-            <a:normAutofit fontScale="85000" lnSpcReduction="20000"/>
+            <a:normAutofit/>
           </a:bodyPr>
           <a:lstStyle/>
           <a:p>
             <a:r>
-              <a:rPr lang="ru-RU" sz="2800" b="1" dirty="0"/>
-              <a:t>Выводы к проекту:</a:t>
-            </a:r>
-          </a:p>
-          <a:p>
-            <a:r>
-              <a:rPr lang="ru-RU" sz="2800" dirty="0"/>
-              <a:t>Виртуальный кошелёк является удобным приложением, реализующим базовые функции управления финансами.</a:t>
-            </a:r>
-            <a:endParaRPr lang="ru-RU" dirty="0">
-              <a:ea typeface="+mn-lt"/>
-              <a:cs typeface="+mn-lt"/>
-            </a:endParaRPr>
-          </a:p>
-          <a:p>
-            <a:r>
-              <a:rPr lang="ru-RU" sz="2800" dirty="0">
+              <a:rPr lang="ru-RU" dirty="0">
+                <a:solidFill>
+                  <a:schemeClr val="bg1"/>
+                </a:solidFill>
+              </a:rPr>
+              <a:t>Окна классов </a:t>
+            </a:r>
+            <a:r>
+              <a:rPr lang="ru-RU" dirty="0" err="1">
+                <a:solidFill>
+                  <a:schemeClr val="bg1"/>
+                </a:solidFill>
                 <a:ea typeface="+mn-lt"/>
                 <a:cs typeface="+mn-lt"/>
               </a:rPr>
-              <a:t>Благодаря Виртуальному кошельку люди смогут легче достигать своих финансовых целей.</a:t>
-            </a:r>
-            <a:endParaRPr lang="ru-RU" dirty="0"/>
-          </a:p>
-          <a:p>
-            <a:r>
-              <a:rPr lang="ru-RU" sz="2800" b="1" dirty="0"/>
-              <a:t>Возможности доработки: </a:t>
-            </a:r>
-            <a:endParaRPr lang="ru-RU" dirty="0"/>
-          </a:p>
-          <a:p>
-            <a:pPr marL="457200" indent="-457200">
-              <a:buChar char="•"/>
-            </a:pPr>
-            <a:r>
-              <a:rPr lang="ru-RU" sz="2800" dirty="0"/>
-              <a:t>Улучшение работы с различными валютами</a:t>
-            </a:r>
-            <a:endParaRPr lang="ru-RU" dirty="0"/>
-          </a:p>
-          <a:p>
-            <a:pPr marL="457200" indent="-457200">
-              <a:buChar char="•"/>
-            </a:pPr>
-            <a:r>
-              <a:rPr lang="ru-RU" sz="2800" dirty="0"/>
-              <a:t>Перевод средств между счетами </a:t>
-            </a:r>
-            <a:endParaRPr lang="ru-RU" dirty="0"/>
-          </a:p>
-          <a:p>
-            <a:pPr marL="457200" indent="-457200">
-              <a:buChar char="•"/>
-            </a:pPr>
-            <a:r>
-              <a:rPr lang="ru-RU" sz="2800" dirty="0"/>
-              <a:t>Улучшение интерфейса</a:t>
-            </a:r>
-            <a:endParaRPr lang="ru-RU" dirty="0"/>
-          </a:p>
-        </p:txBody>
-      </p:sp>
+              <a:t>AddAccountPage</a:t>
+            </a:r>
+            <a:r>
+              <a:rPr lang="ru-RU" dirty="0">
+                <a:solidFill>
+                  <a:schemeClr val="bg1"/>
+                </a:solidFill>
+                <a:ea typeface="+mn-lt"/>
+                <a:cs typeface="+mn-lt"/>
+              </a:rPr>
+              <a:t> и </a:t>
+            </a:r>
+            <a:r>
+              <a:rPr lang="ru-RU" dirty="0" err="1">
+                <a:solidFill>
+                  <a:schemeClr val="bg1"/>
+                </a:solidFill>
+                <a:ea typeface="+mn-lt"/>
+                <a:cs typeface="+mn-lt"/>
+              </a:rPr>
+              <a:t>ChangeAccountDataPage</a:t>
+            </a:r>
+            <a:r>
+              <a:rPr lang="ru-RU" dirty="0">
+                <a:solidFill>
+                  <a:schemeClr val="bg1"/>
+                </a:solidFill>
+                <a:ea typeface="+mn-lt"/>
+                <a:cs typeface="+mn-lt"/>
+              </a:rPr>
+              <a:t>  довольно похожи, они отвечают за добавление и изменение счетов</a:t>
+            </a:r>
+            <a:endParaRPr lang="ru-RU" dirty="0" err="1">
+              <a:solidFill>
+                <a:schemeClr val="bg1"/>
+              </a:solidFill>
+            </a:endParaRPr>
+          </a:p>
+          <a:p>
+            <a:r>
+              <a:rPr lang="ru-RU" dirty="0">
+                <a:solidFill>
+                  <a:schemeClr val="bg1"/>
+                </a:solidFill>
+              </a:rPr>
+              <a:t>На них располагаются поля для ввода названия счёта и комментария, а также </a:t>
+            </a:r>
+            <a:r>
+              <a:rPr lang="ru-RU" dirty="0" err="1">
+                <a:solidFill>
+                  <a:schemeClr val="bg1"/>
+                </a:solidFill>
+              </a:rPr>
+              <a:t>QComboBox</a:t>
+            </a:r>
+            <a:r>
+              <a:rPr lang="ru-RU" dirty="0">
+                <a:solidFill>
+                  <a:schemeClr val="bg1"/>
+                </a:solidFill>
+              </a:rPr>
+              <a:t> выбора валюты</a:t>
+            </a:r>
+          </a:p>
+          <a:p>
+            <a:endParaRPr lang="ru-RU" dirty="0">
+              <a:solidFill>
+                <a:schemeClr val="bg1"/>
+              </a:solidFill>
+            </a:endParaRPr>
+          </a:p>
+        </p:txBody>
+      </p:sp>
+      <p:pic>
+        <p:nvPicPr>
+          <p:cNvPr id="5" name="Рисунок 4" descr="Изображение выглядит как текст, снимок экрана, Шрифт, программное обеспечение&#10;&#10;Автоматически созданное описание">
+            <a:extLst>
+              <a:ext uri="{FF2B5EF4-FFF2-40B4-BE49-F238E27FC236}">
+                <a16:creationId xmlns:a16="http://schemas.microsoft.com/office/drawing/2014/main" id="{500D8DF1-4C58-5093-FDA4-1ED8B29E54D1}"/>
+              </a:ext>
+            </a:extLst>
+          </p:cNvPr>
+          <p:cNvPicPr>
+            <a:picLocks noChangeAspect="1"/>
+          </p:cNvPicPr>
+          <p:nvPr/>
+        </p:nvPicPr>
+        <p:blipFill>
+          <a:blip r:embed="rId2"/>
+          <a:stretch>
+            <a:fillRect/>
+          </a:stretch>
+        </p:blipFill>
+        <p:spPr>
+          <a:xfrm>
+            <a:off x="7407700" y="439783"/>
+            <a:ext cx="3460243" cy="2724942"/>
+          </a:xfrm>
+          <a:prstGeom prst="rect">
+            <a:avLst/>
+          </a:prstGeom>
+        </p:spPr>
+      </p:pic>
+      <p:pic>
+        <p:nvPicPr>
+          <p:cNvPr id="6" name="Рисунок 5" descr="Изображение выглядит как текст, снимок экрана, Шрифт&#10;&#10;Автоматически созданное описание">
+            <a:extLst>
+              <a:ext uri="{FF2B5EF4-FFF2-40B4-BE49-F238E27FC236}">
+                <a16:creationId xmlns:a16="http://schemas.microsoft.com/office/drawing/2014/main" id="{76C7D4F1-1B27-E6BF-960A-43A5879431C2}"/>
+              </a:ext>
+            </a:extLst>
+          </p:cNvPr>
+          <p:cNvPicPr>
+            <a:picLocks noChangeAspect="1"/>
+          </p:cNvPicPr>
+          <p:nvPr/>
+        </p:nvPicPr>
+        <p:blipFill>
+          <a:blip r:embed="rId3"/>
+          <a:stretch>
+            <a:fillRect/>
+          </a:stretch>
+        </p:blipFill>
+        <p:spPr>
+          <a:xfrm>
+            <a:off x="7396645" y="3503659"/>
+            <a:ext cx="3482354" cy="2724942"/>
+          </a:xfrm>
+          <a:prstGeom prst="rect">
+            <a:avLst/>
+          </a:prstGeom>
+        </p:spPr>
+      </p:pic>
+      <p:cxnSp>
+        <p:nvCxnSpPr>
+          <p:cNvPr id="10" name="Прямая со стрелкой 9">
+            <a:extLst>
+              <a:ext uri="{FF2B5EF4-FFF2-40B4-BE49-F238E27FC236}">
+                <a16:creationId xmlns:a16="http://schemas.microsoft.com/office/drawing/2014/main" id="{7847155A-249B-B7D1-47ED-07D3356DDA53}"/>
+              </a:ext>
+            </a:extLst>
+          </p:cNvPr>
+          <p:cNvCxnSpPr/>
+          <p:nvPr/>
+        </p:nvCxnSpPr>
+        <p:spPr>
+          <a:xfrm flipV="1">
+            <a:off x="3829051" y="1842655"/>
+            <a:ext cx="3321625" cy="1276348"/>
+          </a:xfrm>
+          <a:prstGeom prst="straightConnector1">
+            <a:avLst/>
+          </a:prstGeom>
+          <a:ln w="57150">
+            <a:tailEnd type="triangle"/>
+          </a:ln>
+        </p:spPr>
+        <p:style>
+          <a:lnRef idx="1">
+            <a:schemeClr val="accent1"/>
+          </a:lnRef>
+          <a:fillRef idx="0">
+            <a:schemeClr val="accent1"/>
+          </a:fillRef>
+          <a:effectRef idx="0">
+            <a:schemeClr val="accent1"/>
+          </a:effectRef>
+          <a:fontRef idx="minor">
+            <a:schemeClr val="tx1"/>
+          </a:fontRef>
+        </p:style>
+      </p:cxnSp>
     </p:spTree>
     <p:extLst>
       <p:ext uri="{BB962C8B-B14F-4D97-AF65-F5344CB8AC3E}">
-        <p14:creationId xmlns:p14="http://schemas.microsoft.com/office/powerpoint/2010/main" val="2067731151"/>
+        <p14:creationId xmlns:p14="http://schemas.microsoft.com/office/powerpoint/2010/main" val="12097108"/>
       </p:ext>
     </p:extLst>
   </p:cSld>

</xml_diff>